<commit_message>
Added Factorial; improved slides
</commit_message>
<xml_diff>
--- a/slides/M-02-01-Loops-Invariants.pptx
+++ b/slides/M-02-01-Loops-Invariants.pptx
@@ -6481,7 +6481,7 @@
           <a:p>
             <a:r>
               <a:rPr lang="en-US" sz="3600" dirty="0"/>
-              <a:t>While Loops</a:t>
+              <a:t>Implementation using a While Loop</a:t>
             </a:r>
           </a:p>
         </p:txBody>
@@ -8286,6 +8286,403 @@
           </a:p>
         </p:txBody>
       </p:sp>
+      <p:sp>
+        <p:nvSpPr>
+          <p:cNvPr id="5" name="Rectangle 4">
+            <a:extLst>
+              <a:ext uri="{FF2B5EF4-FFF2-40B4-BE49-F238E27FC236}">
+                <a16:creationId xmlns:a16="http://schemas.microsoft.com/office/drawing/2014/main" id="{D61A6678-5EC5-EB4B-460D-BA3F86D15BCE}"/>
+              </a:ext>
+            </a:extLst>
+          </p:cNvPr>
+          <p:cNvSpPr/>
+          <p:nvPr/>
+        </p:nvSpPr>
+        <p:spPr bwMode="auto">
+          <a:xfrm>
+            <a:off x="4038600" y="2743200"/>
+            <a:ext cx="2895600" cy="685800"/>
+          </a:xfrm>
+          <a:prstGeom prst="rect">
+            <a:avLst/>
+          </a:prstGeom>
+          <a:solidFill>
+            <a:srgbClr val="FFE267"/>
+          </a:solidFill>
+          <a:ln w="9525" cap="flat" cmpd="sng" algn="ctr">
+            <a:solidFill>
+              <a:schemeClr val="tx1"/>
+            </a:solidFill>
+            <a:prstDash val="solid"/>
+            <a:miter lim="800000"/>
+            <a:headEnd type="none" w="med" len="med"/>
+            <a:tailEnd type="none" w="med" len="med"/>
+          </a:ln>
+          <a:effectLst/>
+        </p:spPr>
+        <p:txBody>
+          <a:bodyPr vert="horz" wrap="square" lIns="91440" tIns="45720" rIns="91440" bIns="45720" numCol="1" rtlCol="0" anchor="t" anchorCtr="0" compatLnSpc="1">
+            <a:prstTxWarp prst="textNoShape">
+              <a:avLst/>
+            </a:prstTxWarp>
+          </a:bodyPr>
+          <a:lstStyle/>
+          <a:p>
+            <a:pPr marL="0" marR="0" indent="0" algn="l" defTabSz="914400" rtl="0" eaLnBrk="1" fontAlgn="base" latinLnBrk="0" hangingPunct="1">
+              <a:lnSpc>
+                <a:spcPct val="100000"/>
+              </a:lnSpc>
+              <a:spcBef>
+                <a:spcPct val="0"/>
+              </a:spcBef>
+              <a:spcAft>
+                <a:spcPct val="0"/>
+              </a:spcAft>
+              <a:buClrTx/>
+              <a:buSzTx/>
+              <a:buFontTx/>
+              <a:buNone/>
+              <a:tabLst/>
+            </a:pPr>
+            <a:r>
+              <a:rPr kumimoji="0" lang="en-GB" sz="1800" b="0" i="0" u="none" strike="noStrike" cap="none" normalizeH="0" baseline="0" dirty="0">
+                <a:ln>
+                  <a:noFill/>
+                </a:ln>
+                <a:solidFill>
+                  <a:schemeClr val="tx1"/>
+                </a:solidFill>
+                <a:effectLst/>
+                <a:latin typeface="Tahoma" charset="0"/>
+              </a:rPr>
+              <a:t>Variables </a:t>
+            </a:r>
+            <a:r>
+              <a:rPr kumimoji="0" lang="en-GB" sz="1800" b="0" i="0" u="none" strike="noStrike" cap="none" normalizeH="0" baseline="0" dirty="0">
+                <a:ln>
+                  <a:noFill/>
+                </a:ln>
+                <a:solidFill>
+                  <a:srgbClr val="8922FD"/>
+                </a:solidFill>
+                <a:effectLst/>
+                <a:latin typeface="Menlo" panose="020B0609030804020204" pitchFamily="49" charset="0"/>
+                <a:ea typeface="Menlo" panose="020B0609030804020204" pitchFamily="49" charset="0"/>
+                <a:cs typeface="Menlo" panose="020B0609030804020204" pitchFamily="49" charset="0"/>
+              </a:rPr>
+              <a:t>x</a:t>
+            </a:r>
+            <a:r>
+              <a:rPr kumimoji="0" lang="en-GB" sz="1800" b="0" i="0" u="none" strike="noStrike" cap="none" normalizeH="0" baseline="0" dirty="0">
+                <a:ln>
+                  <a:noFill/>
+                </a:ln>
+                <a:solidFill>
+                  <a:schemeClr val="tx1"/>
+                </a:solidFill>
+                <a:effectLst/>
+                <a:latin typeface="Tahoma" charset="0"/>
+              </a:rPr>
+              <a:t> and </a:t>
+            </a:r>
+            <a:r>
+              <a:rPr kumimoji="0" lang="en-GB" sz="1800" b="0" i="0" u="none" strike="noStrike" cap="none" normalizeH="0" baseline="0" dirty="0">
+                <a:ln>
+                  <a:noFill/>
+                </a:ln>
+                <a:solidFill>
+                  <a:srgbClr val="8922FD"/>
+                </a:solidFill>
+                <a:effectLst/>
+                <a:latin typeface="Menlo" panose="020B0609030804020204" pitchFamily="49" charset="0"/>
+                <a:ea typeface="Menlo" panose="020B0609030804020204" pitchFamily="49" charset="0"/>
+                <a:cs typeface="Menlo" panose="020B0609030804020204" pitchFamily="49" charset="0"/>
+              </a:rPr>
+              <a:t>m</a:t>
+            </a:r>
+            <a:r>
+              <a:rPr kumimoji="0" lang="en-GB" sz="1800" b="0" i="0" u="none" strike="noStrike" cap="none" normalizeH="0" baseline="0" dirty="0">
+                <a:ln>
+                  <a:noFill/>
+                </a:ln>
+                <a:solidFill>
+                  <a:schemeClr val="tx1"/>
+                </a:solidFill>
+                <a:effectLst/>
+                <a:latin typeface="Tahoma" charset="0"/>
+              </a:rPr>
+              <a:t> are modified by the loop body</a:t>
+            </a:r>
+          </a:p>
+        </p:txBody>
+      </p:sp>
+      <p:cxnSp>
+        <p:nvCxnSpPr>
+          <p:cNvPr id="7" name="Straight Arrow Connector 6">
+            <a:extLst>
+              <a:ext uri="{FF2B5EF4-FFF2-40B4-BE49-F238E27FC236}">
+                <a16:creationId xmlns:a16="http://schemas.microsoft.com/office/drawing/2014/main" id="{5063BD3A-71C8-1A73-7C49-FFDBD293C13C}"/>
+              </a:ext>
+            </a:extLst>
+          </p:cNvPr>
+          <p:cNvCxnSpPr>
+            <a:stCxn id="5" idx="1"/>
+          </p:cNvCxnSpPr>
+          <p:nvPr/>
+        </p:nvCxnSpPr>
+        <p:spPr bwMode="auto">
+          <a:xfrm flipH="1">
+            <a:off x="2819400" y="3086100"/>
+            <a:ext cx="1219200" cy="571500"/>
+          </a:xfrm>
+          <a:prstGeom prst="straightConnector1">
+            <a:avLst/>
+          </a:prstGeom>
+          <a:solidFill>
+            <a:schemeClr val="accent1"/>
+          </a:solidFill>
+          <a:ln w="15875" cap="flat" cmpd="sng" algn="ctr">
+            <a:solidFill>
+              <a:schemeClr val="tx1"/>
+            </a:solidFill>
+            <a:prstDash val="solid"/>
+            <a:miter lim="800000"/>
+            <a:headEnd type="none" w="med" len="med"/>
+            <a:tailEnd type="triangle" w="lg" len="med"/>
+          </a:ln>
+          <a:effectLst/>
+        </p:spPr>
+      </p:cxnSp>
+      <p:sp>
+        <p:nvSpPr>
+          <p:cNvPr id="8" name="Rectangle 7">
+            <a:extLst>
+              <a:ext uri="{FF2B5EF4-FFF2-40B4-BE49-F238E27FC236}">
+                <a16:creationId xmlns:a16="http://schemas.microsoft.com/office/drawing/2014/main" id="{679795C7-5264-6CBB-A8CB-D89930014CF7}"/>
+              </a:ext>
+            </a:extLst>
+          </p:cNvPr>
+          <p:cNvSpPr/>
+          <p:nvPr/>
+        </p:nvSpPr>
+        <p:spPr bwMode="auto">
+          <a:xfrm>
+            <a:off x="4389383" y="3640972"/>
+            <a:ext cx="2895600" cy="685800"/>
+          </a:xfrm>
+          <a:prstGeom prst="rect">
+            <a:avLst/>
+          </a:prstGeom>
+          <a:solidFill>
+            <a:srgbClr val="FFE267"/>
+          </a:solidFill>
+          <a:ln w="9525" cap="flat" cmpd="sng" algn="ctr">
+            <a:solidFill>
+              <a:schemeClr val="tx1"/>
+            </a:solidFill>
+            <a:prstDash val="solid"/>
+            <a:miter lim="800000"/>
+            <a:headEnd type="none" w="med" len="med"/>
+            <a:tailEnd type="none" w="med" len="med"/>
+          </a:ln>
+          <a:effectLst/>
+        </p:spPr>
+        <p:txBody>
+          <a:bodyPr vert="horz" wrap="square" lIns="91440" tIns="45720" rIns="91440" bIns="45720" numCol="1" rtlCol="0" anchor="t" anchorCtr="0" compatLnSpc="1">
+            <a:prstTxWarp prst="textNoShape">
+              <a:avLst/>
+            </a:prstTxWarp>
+          </a:bodyPr>
+          <a:lstStyle/>
+          <a:p>
+            <a:pPr marL="0" marR="0" indent="0" algn="l" defTabSz="914400" rtl="0" eaLnBrk="1" fontAlgn="base" latinLnBrk="0" hangingPunct="1">
+              <a:lnSpc>
+                <a:spcPct val="100000"/>
+              </a:lnSpc>
+              <a:spcBef>
+                <a:spcPct val="0"/>
+              </a:spcBef>
+              <a:spcAft>
+                <a:spcPct val="0"/>
+              </a:spcAft>
+              <a:buClrTx/>
+              <a:buSzTx/>
+              <a:buFontTx/>
+              <a:buNone/>
+              <a:tabLst/>
+            </a:pPr>
+            <a:r>
+              <a:rPr lang="en-GB" sz="1800" dirty="0">
+                <a:latin typeface="Tahoma" charset="0"/>
+              </a:rPr>
+              <a:t>Inductive property (that is continually true)</a:t>
+            </a:r>
+            <a:endParaRPr kumimoji="0" lang="en-GB" sz="1800" b="0" i="0" u="none" strike="noStrike" cap="none" normalizeH="0" baseline="0" dirty="0">
+              <a:ln>
+                <a:noFill/>
+              </a:ln>
+              <a:solidFill>
+                <a:schemeClr val="tx1"/>
+              </a:solidFill>
+              <a:effectLst/>
+              <a:latin typeface="Tahoma" charset="0"/>
+            </a:endParaRPr>
+          </a:p>
+        </p:txBody>
+      </p:sp>
+      <p:cxnSp>
+        <p:nvCxnSpPr>
+          <p:cNvPr id="9" name="Straight Arrow Connector 8">
+            <a:extLst>
+              <a:ext uri="{FF2B5EF4-FFF2-40B4-BE49-F238E27FC236}">
+                <a16:creationId xmlns:a16="http://schemas.microsoft.com/office/drawing/2014/main" id="{05AB5384-9C04-C179-C77C-50E7AB8ABC50}"/>
+              </a:ext>
+            </a:extLst>
+          </p:cNvPr>
+          <p:cNvCxnSpPr>
+            <a:cxnSpLocks/>
+            <a:stCxn id="8" idx="1"/>
+          </p:cNvCxnSpPr>
+          <p:nvPr/>
+        </p:nvCxnSpPr>
+        <p:spPr bwMode="auto">
+          <a:xfrm flipH="1">
+            <a:off x="3048000" y="3983872"/>
+            <a:ext cx="1341383" cy="130928"/>
+          </a:xfrm>
+          <a:prstGeom prst="straightConnector1">
+            <a:avLst/>
+          </a:prstGeom>
+          <a:solidFill>
+            <a:schemeClr val="accent1"/>
+          </a:solidFill>
+          <a:ln w="15875" cap="flat" cmpd="sng" algn="ctr">
+            <a:solidFill>
+              <a:schemeClr val="tx1"/>
+            </a:solidFill>
+            <a:prstDash val="solid"/>
+            <a:miter lim="800000"/>
+            <a:headEnd type="none" w="med" len="med"/>
+            <a:tailEnd type="triangle" w="lg" len="med"/>
+          </a:ln>
+          <a:effectLst/>
+        </p:spPr>
+      </p:cxnSp>
+      <p:sp>
+        <p:nvSpPr>
+          <p:cNvPr id="12" name="Rectangle 11">
+            <a:extLst>
+              <a:ext uri="{FF2B5EF4-FFF2-40B4-BE49-F238E27FC236}">
+                <a16:creationId xmlns:a16="http://schemas.microsoft.com/office/drawing/2014/main" id="{2C24A680-1E26-F774-7573-97E23168EC31}"/>
+              </a:ext>
+            </a:extLst>
+          </p:cNvPr>
+          <p:cNvSpPr/>
+          <p:nvPr/>
+        </p:nvSpPr>
+        <p:spPr bwMode="auto">
+          <a:xfrm>
+            <a:off x="4389382" y="5773004"/>
+            <a:ext cx="3078217" cy="685800"/>
+          </a:xfrm>
+          <a:prstGeom prst="rect">
+            <a:avLst/>
+          </a:prstGeom>
+          <a:solidFill>
+            <a:srgbClr val="FFE267"/>
+          </a:solidFill>
+          <a:ln w="9525" cap="flat" cmpd="sng" algn="ctr">
+            <a:solidFill>
+              <a:schemeClr val="tx1"/>
+            </a:solidFill>
+            <a:prstDash val="solid"/>
+            <a:miter lim="800000"/>
+            <a:headEnd type="none" w="med" len="med"/>
+            <a:tailEnd type="none" w="med" len="med"/>
+          </a:ln>
+          <a:effectLst/>
+        </p:spPr>
+        <p:txBody>
+          <a:bodyPr vert="horz" wrap="square" lIns="91440" tIns="45720" rIns="91440" bIns="45720" numCol="1" rtlCol="0" anchor="t" anchorCtr="0" compatLnSpc="1">
+            <a:prstTxWarp prst="textNoShape">
+              <a:avLst/>
+            </a:prstTxWarp>
+          </a:bodyPr>
+          <a:lstStyle/>
+          <a:p>
+            <a:pPr marL="0" marR="0" indent="0" algn="l" defTabSz="914400" rtl="0" eaLnBrk="1" fontAlgn="base" latinLnBrk="0" hangingPunct="1">
+              <a:lnSpc>
+                <a:spcPct val="100000"/>
+              </a:lnSpc>
+              <a:spcBef>
+                <a:spcPct val="0"/>
+              </a:spcBef>
+              <a:spcAft>
+                <a:spcPct val="0"/>
+              </a:spcAft>
+              <a:buClrTx/>
+              <a:buSzTx/>
+              <a:buFontTx/>
+              <a:buNone/>
+              <a:tabLst/>
+            </a:pPr>
+            <a:r>
+              <a:rPr lang="en-GB" sz="1800" dirty="0">
+                <a:latin typeface="Tahoma" charset="0"/>
+              </a:rPr>
+              <a:t>Property that can be inferred on loop termination</a:t>
+            </a:r>
+            <a:endParaRPr kumimoji="0" lang="en-GB" sz="1800" b="0" i="0" u="none" strike="noStrike" cap="none" normalizeH="0" baseline="0" dirty="0">
+              <a:ln>
+                <a:noFill/>
+              </a:ln>
+              <a:solidFill>
+                <a:schemeClr val="tx1"/>
+              </a:solidFill>
+              <a:effectLst/>
+              <a:latin typeface="Tahoma" charset="0"/>
+            </a:endParaRPr>
+          </a:p>
+        </p:txBody>
+      </p:sp>
+      <p:cxnSp>
+        <p:nvCxnSpPr>
+          <p:cNvPr id="13" name="Straight Arrow Connector 12">
+            <a:extLst>
+              <a:ext uri="{FF2B5EF4-FFF2-40B4-BE49-F238E27FC236}">
+                <a16:creationId xmlns:a16="http://schemas.microsoft.com/office/drawing/2014/main" id="{EB020834-CBEE-0AFE-A0DF-14FB28400094}"/>
+              </a:ext>
+            </a:extLst>
+          </p:cNvPr>
+          <p:cNvCxnSpPr>
+            <a:cxnSpLocks/>
+            <a:stCxn id="12" idx="1"/>
+          </p:cNvCxnSpPr>
+          <p:nvPr/>
+        </p:nvCxnSpPr>
+        <p:spPr bwMode="auto">
+          <a:xfrm flipH="1">
+            <a:off x="3048000" y="6115904"/>
+            <a:ext cx="1341382" cy="0"/>
+          </a:xfrm>
+          <a:prstGeom prst="straightConnector1">
+            <a:avLst/>
+          </a:prstGeom>
+          <a:solidFill>
+            <a:schemeClr val="accent1"/>
+          </a:solidFill>
+          <a:ln w="15875" cap="flat" cmpd="sng" algn="ctr">
+            <a:solidFill>
+              <a:schemeClr val="tx1"/>
+            </a:solidFill>
+            <a:prstDash val="solid"/>
+            <a:miter lim="800000"/>
+            <a:headEnd type="none" w="med" len="med"/>
+            <a:tailEnd type="triangle" w="lg" len="med"/>
+          </a:ln>
+          <a:effectLst/>
+        </p:spPr>
+      </p:cxnSp>
     </p:spTree>
     <p:extLst>
       <p:ext uri="{BB962C8B-B14F-4D97-AF65-F5344CB8AC3E}">
@@ -13406,7 +13803,15 @@
           <a:p>
             <a:r>
               <a:rPr lang="en-US" sz="3600" dirty="0"/>
-              <a:t>While Loops</a:t>
+              <a:t>Specification (The </a:t>
+            </a:r>
+            <a:r>
+              <a:rPr lang="en-US" sz="3600" dirty="0" err="1"/>
+              <a:t>maths</a:t>
+            </a:r>
+            <a:r>
+              <a:rPr lang="en-US" sz="3600" dirty="0"/>
+              <a:t>)</a:t>
             </a:r>
           </a:p>
         </p:txBody>
@@ -13958,6 +14363,118 @@
           </a:p>
         </p:txBody>
       </p:sp>
+      <p:sp>
+        <p:nvSpPr>
+          <p:cNvPr id="5" name="Rectangle 4">
+            <a:extLst>
+              <a:ext uri="{FF2B5EF4-FFF2-40B4-BE49-F238E27FC236}">
+                <a16:creationId xmlns:a16="http://schemas.microsoft.com/office/drawing/2014/main" id="{D9D2C4EE-F351-5B7E-973A-4CDA368707F4}"/>
+              </a:ext>
+            </a:extLst>
+          </p:cNvPr>
+          <p:cNvSpPr/>
+          <p:nvPr/>
+        </p:nvSpPr>
+        <p:spPr bwMode="auto">
+          <a:xfrm>
+            <a:off x="3124200" y="3581400"/>
+            <a:ext cx="2895600" cy="685800"/>
+          </a:xfrm>
+          <a:prstGeom prst="rect">
+            <a:avLst/>
+          </a:prstGeom>
+          <a:solidFill>
+            <a:srgbClr val="FFE267"/>
+          </a:solidFill>
+          <a:ln w="9525" cap="flat" cmpd="sng" algn="ctr">
+            <a:solidFill>
+              <a:schemeClr val="tx1"/>
+            </a:solidFill>
+            <a:prstDash val="solid"/>
+            <a:miter lim="800000"/>
+            <a:headEnd type="none" w="med" len="med"/>
+            <a:tailEnd type="none" w="med" len="med"/>
+          </a:ln>
+          <a:effectLst/>
+        </p:spPr>
+        <p:txBody>
+          <a:bodyPr vert="horz" wrap="square" lIns="91440" tIns="45720" rIns="91440" bIns="45720" numCol="1" rtlCol="0" anchor="t" anchorCtr="0" compatLnSpc="1">
+            <a:prstTxWarp prst="textNoShape">
+              <a:avLst/>
+            </a:prstTxWarp>
+          </a:bodyPr>
+          <a:lstStyle/>
+          <a:p>
+            <a:pPr marL="0" marR="0" indent="0" algn="l" defTabSz="914400" rtl="0" eaLnBrk="1" fontAlgn="base" latinLnBrk="0" hangingPunct="1">
+              <a:lnSpc>
+                <a:spcPct val="100000"/>
+              </a:lnSpc>
+              <a:spcBef>
+                <a:spcPct val="0"/>
+              </a:spcBef>
+              <a:spcAft>
+                <a:spcPct val="0"/>
+              </a:spcAft>
+              <a:buClrTx/>
+              <a:buSzTx/>
+              <a:buFontTx/>
+              <a:buNone/>
+              <a:tabLst/>
+            </a:pPr>
+            <a:r>
+              <a:rPr kumimoji="0" lang="en-GB" sz="1800" b="0" i="0" u="none" strike="noStrike" cap="none" normalizeH="0" baseline="0" dirty="0">
+                <a:ln>
+                  <a:noFill/>
+                </a:ln>
+                <a:solidFill>
+                  <a:schemeClr val="tx1"/>
+                </a:solidFill>
+                <a:effectLst/>
+                <a:latin typeface="Tahoma" charset="0"/>
+              </a:rPr>
+              <a:t>Recursive specification of the factorial function</a:t>
+            </a:r>
+          </a:p>
+        </p:txBody>
+      </p:sp>
+      <p:cxnSp>
+        <p:nvCxnSpPr>
+          <p:cNvPr id="6" name="Straight Arrow Connector 5">
+            <a:extLst>
+              <a:ext uri="{FF2B5EF4-FFF2-40B4-BE49-F238E27FC236}">
+                <a16:creationId xmlns:a16="http://schemas.microsoft.com/office/drawing/2014/main" id="{FBB8BB8E-7A47-E0AF-1EE7-A4CFB3B16B33}"/>
+              </a:ext>
+            </a:extLst>
+          </p:cNvPr>
+          <p:cNvCxnSpPr>
+            <a:cxnSpLocks/>
+            <a:stCxn id="5" idx="0"/>
+          </p:cNvCxnSpPr>
+          <p:nvPr/>
+        </p:nvCxnSpPr>
+        <p:spPr bwMode="auto">
+          <a:xfrm flipH="1" flipV="1">
+            <a:off x="3810000" y="2721045"/>
+            <a:ext cx="762000" cy="860355"/>
+          </a:xfrm>
+          <a:prstGeom prst="straightConnector1">
+            <a:avLst/>
+          </a:prstGeom>
+          <a:solidFill>
+            <a:schemeClr val="accent1"/>
+          </a:solidFill>
+          <a:ln w="15875" cap="flat" cmpd="sng" algn="ctr">
+            <a:solidFill>
+              <a:schemeClr val="tx1"/>
+            </a:solidFill>
+            <a:prstDash val="solid"/>
+            <a:miter lim="800000"/>
+            <a:headEnd type="none" w="med" len="med"/>
+            <a:tailEnd type="triangle" w="lg" len="med"/>
+          </a:ln>
+          <a:effectLst/>
+        </p:spPr>
+      </p:cxnSp>
     </p:spTree>
     <p:extLst>
       <p:ext uri="{BB962C8B-B14F-4D97-AF65-F5344CB8AC3E}">

</xml_diff>